<commit_message>
updated notebook w/ presentation code
</commit_message>
<xml_diff>
--- a/Intro to TensorFlow.pptx
+++ b/Intro to TensorFlow.pptx
@@ -874,7 +874,7 @@
           <a:p>
             <a:fld id="{298525EE-5227-4DF5-8345-755789459F72}" type="datetimeFigureOut">
               <a:rPr lang="en-US" smtClean="0"/>
-              <a:t>12/28/2017</a:t>
+              <a:t>1/17/2018</a:t>
             </a:fld>
             <a:endParaRPr lang="en-US"/>
           </a:p>
@@ -1125,7 +1125,7 @@
           <a:p>
             <a:fld id="{298525EE-5227-4DF5-8345-755789459F72}" type="datetimeFigureOut">
               <a:rPr lang="en-US" smtClean="0"/>
-              <a:t>12/28/2017</a:t>
+              <a:t>1/17/2018</a:t>
             </a:fld>
             <a:endParaRPr lang="en-US"/>
           </a:p>
@@ -1439,7 +1439,7 @@
           <a:p>
             <a:fld id="{298525EE-5227-4DF5-8345-755789459F72}" type="datetimeFigureOut">
               <a:rPr lang="en-US" smtClean="0"/>
-              <a:t>12/28/2017</a:t>
+              <a:t>1/17/2018</a:t>
             </a:fld>
             <a:endParaRPr lang="en-US"/>
           </a:p>
@@ -1772,7 +1772,7 @@
           <a:p>
             <a:fld id="{298525EE-5227-4DF5-8345-755789459F72}" type="datetimeFigureOut">
               <a:rPr lang="en-US" smtClean="0"/>
-              <a:t>12/28/2017</a:t>
+              <a:t>1/17/2018</a:t>
             </a:fld>
             <a:endParaRPr lang="en-US"/>
           </a:p>
@@ -2086,7 +2086,7 @@
           <a:p>
             <a:fld id="{298525EE-5227-4DF5-8345-755789459F72}" type="datetimeFigureOut">
               <a:rPr lang="en-US" smtClean="0"/>
-              <a:t>12/28/2017</a:t>
+              <a:t>1/17/2018</a:t>
             </a:fld>
             <a:endParaRPr lang="en-US"/>
           </a:p>
@@ -2479,7 +2479,7 @@
           <a:p>
             <a:fld id="{298525EE-5227-4DF5-8345-755789459F72}" type="datetimeFigureOut">
               <a:rPr lang="en-US" smtClean="0"/>
-              <a:t>12/28/2017</a:t>
+              <a:t>1/17/2018</a:t>
             </a:fld>
             <a:endParaRPr lang="en-US"/>
           </a:p>
@@ -2649,7 +2649,7 @@
           <a:p>
             <a:fld id="{298525EE-5227-4DF5-8345-755789459F72}" type="datetimeFigureOut">
               <a:rPr lang="en-US" smtClean="0"/>
-              <a:t>12/28/2017</a:t>
+              <a:t>1/17/2018</a:t>
             </a:fld>
             <a:endParaRPr lang="en-US"/>
           </a:p>
@@ -2829,7 +2829,7 @@
           <a:p>
             <a:fld id="{298525EE-5227-4DF5-8345-755789459F72}" type="datetimeFigureOut">
               <a:rPr lang="en-US" smtClean="0"/>
-              <a:t>12/28/2017</a:t>
+              <a:t>1/17/2018</a:t>
             </a:fld>
             <a:endParaRPr lang="en-US"/>
           </a:p>
@@ -2999,7 +2999,7 @@
           <a:p>
             <a:fld id="{298525EE-5227-4DF5-8345-755789459F72}" type="datetimeFigureOut">
               <a:rPr lang="en-US" smtClean="0"/>
-              <a:t>12/28/2017</a:t>
+              <a:t>1/17/2018</a:t>
             </a:fld>
             <a:endParaRPr lang="en-US"/>
           </a:p>
@@ -3246,7 +3246,7 @@
           <a:p>
             <a:fld id="{298525EE-5227-4DF5-8345-755789459F72}" type="datetimeFigureOut">
               <a:rPr lang="en-US" smtClean="0"/>
-              <a:t>12/28/2017</a:t>
+              <a:t>1/17/2018</a:t>
             </a:fld>
             <a:endParaRPr lang="en-US"/>
           </a:p>
@@ -3478,7 +3478,7 @@
           <a:p>
             <a:fld id="{298525EE-5227-4DF5-8345-755789459F72}" type="datetimeFigureOut">
               <a:rPr lang="en-US" smtClean="0"/>
-              <a:t>12/28/2017</a:t>
+              <a:t>1/17/2018</a:t>
             </a:fld>
             <a:endParaRPr lang="en-US"/>
           </a:p>
@@ -3852,7 +3852,7 @@
           <a:p>
             <a:fld id="{298525EE-5227-4DF5-8345-755789459F72}" type="datetimeFigureOut">
               <a:rPr lang="en-US" smtClean="0"/>
-              <a:t>12/28/2017</a:t>
+              <a:t>1/17/2018</a:t>
             </a:fld>
             <a:endParaRPr lang="en-US"/>
           </a:p>
@@ -3975,7 +3975,7 @@
           <a:p>
             <a:fld id="{298525EE-5227-4DF5-8345-755789459F72}" type="datetimeFigureOut">
               <a:rPr lang="en-US" smtClean="0"/>
-              <a:t>12/28/2017</a:t>
+              <a:t>1/17/2018</a:t>
             </a:fld>
             <a:endParaRPr lang="en-US"/>
           </a:p>
@@ -4070,7 +4070,7 @@
           <a:p>
             <a:fld id="{298525EE-5227-4DF5-8345-755789459F72}" type="datetimeFigureOut">
               <a:rPr lang="en-US" smtClean="0"/>
-              <a:t>12/28/2017</a:t>
+              <a:t>1/17/2018</a:t>
             </a:fld>
             <a:endParaRPr lang="en-US"/>
           </a:p>
@@ -4325,7 +4325,7 @@
           <a:p>
             <a:fld id="{298525EE-5227-4DF5-8345-755789459F72}" type="datetimeFigureOut">
               <a:rPr lang="en-US" smtClean="0"/>
-              <a:t>12/28/2017</a:t>
+              <a:t>1/17/2018</a:t>
             </a:fld>
             <a:endParaRPr lang="en-US"/>
           </a:p>
@@ -4630,7 +4630,7 @@
           <a:p>
             <a:fld id="{298525EE-5227-4DF5-8345-755789459F72}" type="datetimeFigureOut">
               <a:rPr lang="en-US" smtClean="0"/>
-              <a:t>12/28/2017</a:t>
+              <a:t>1/17/2018</a:t>
             </a:fld>
             <a:endParaRPr lang="en-US"/>
           </a:p>
@@ -5332,7 +5332,7 @@
           <a:p>
             <a:fld id="{298525EE-5227-4DF5-8345-755789459F72}" type="datetimeFigureOut">
               <a:rPr lang="en-US" smtClean="0"/>
-              <a:t>12/28/2017</a:t>
+              <a:t>1/17/2018</a:t>
             </a:fld>
             <a:endParaRPr lang="en-US"/>
           </a:p>
@@ -6032,25 +6032,10 @@
             </a:r>
           </a:p>
           <a:p>
-            <a:r>
-              <a:rPr lang="en-US" dirty="0" smtClean="0"/>
-              <a:t>You can’t just ‘drop’ a </a:t>
-            </a:r>
-            <a:r>
-              <a:rPr lang="en-US" dirty="0" err="1" smtClean="0"/>
-              <a:t>Numpy</a:t>
-            </a:r>
-            <a:r>
-              <a:rPr lang="en-US" dirty="0" smtClean="0"/>
-              <a:t> or Pandas object into a </a:t>
-            </a:r>
-            <a:r>
-              <a:rPr lang="en-US" dirty="0" err="1" smtClean="0"/>
-              <a:t>TensorFlow</a:t>
-            </a:r>
-            <a:r>
-              <a:rPr lang="en-US" dirty="0" smtClean="0"/>
-              <a:t> graph and have it work (usually)</a:t>
+            <a:pPr lvl="1"/>
+            <a:r>
+              <a:rPr lang="en-US" dirty="0" smtClean="0"/>
+              <a:t>This makes debugging something of a pain</a:t>
             </a:r>
           </a:p>
           <a:p>
@@ -6305,7 +6290,7 @@
         <p:spPr/>
         <p:txBody>
           <a:bodyPr>
-            <a:normAutofit lnSpcReduction="10000"/>
+            <a:normAutofit fontScale="92500" lnSpcReduction="20000"/>
           </a:bodyPr>
           <a:lstStyle/>
           <a:p>
@@ -6329,7 +6314,15 @@
             </a:pPr>
             <a:r>
               <a:rPr lang="en-US" dirty="0" smtClean="0"/>
-              <a:t>Variables can accept any kind of input, but are almost always either initialized to a specific value, or randomly initialized.</a:t>
+              <a:t>Variables can accept any kind of input, but are </a:t>
+            </a:r>
+            <a:r>
+              <a:rPr lang="en-US" dirty="0" err="1" smtClean="0"/>
+              <a:t>usuallyeither</a:t>
+            </a:r>
+            <a:r>
+              <a:rPr lang="en-US" dirty="0" smtClean="0"/>
+              <a:t> initialized to a specific value, or randomly initialized.</a:t>
             </a:r>
             <a:endParaRPr lang="en-US" dirty="0"/>
           </a:p>
@@ -6380,6 +6373,20 @@
               <a:t>arxiv.org/pdf/1412.6980.pdf</a:t>
             </a:r>
             <a:endParaRPr lang="en-US" dirty="0" smtClean="0"/>
+          </a:p>
+          <a:p>
+            <a:r>
+              <a:rPr lang="en-US" dirty="0" smtClean="0"/>
+              <a:t>Not my personal favorite though, I like </a:t>
+            </a:r>
+            <a:r>
+              <a:rPr lang="en-US" dirty="0" err="1" smtClean="0"/>
+              <a:t>AdaDelta</a:t>
+            </a:r>
+            <a:r>
+              <a:rPr lang="en-US" dirty="0" smtClean="0"/>
+              <a:t> better</a:t>
+            </a:r>
           </a:p>
           <a:p>
             <a:endParaRPr lang="en-US" dirty="0"/>
@@ -6482,13 +6489,13 @@
           <a:p>
             <a:r>
               <a:rPr lang="en-US" dirty="0" smtClean="0"/>
-              <a:t>Are designed for the optimizer to update them automatically</a:t>
-            </a:r>
-          </a:p>
-          <a:p>
-            <a:r>
-              <a:rPr lang="en-US" dirty="0" smtClean="0"/>
-              <a:t>Use for model coefficients</a:t>
+              <a:t>Are designed for the optimizer to update automatically</a:t>
+            </a:r>
+          </a:p>
+          <a:p>
+            <a:r>
+              <a:rPr lang="en-US" dirty="0" smtClean="0"/>
+              <a:t>Usually used for model coefficients</a:t>
             </a:r>
           </a:p>
           <a:p>
@@ -6511,8 +6518,12 @@
           </a:p>
           <a:p>
             <a:r>
-              <a:rPr lang="en-US" dirty="0" smtClean="0"/>
-              <a:t>Use for feature &amp; label data</a:t>
+              <a:rPr lang="en-US" smtClean="0"/>
+              <a:t>Usually used </a:t>
+            </a:r>
+            <a:r>
+              <a:rPr lang="en-US" dirty="0" smtClean="0"/>
+              <a:t>for feature &amp; label data</a:t>
             </a:r>
             <a:endParaRPr lang="en-US" dirty="0"/>
           </a:p>
@@ -6994,6 +7005,93 @@
             <a:r>
               <a:rPr lang="en-US" dirty="0" smtClean="0"/>
               <a:t>Time for a live demo!</a:t>
+            </a:r>
+          </a:p>
+          <a:p>
+            <a:pPr marL="0" indent="0">
+              <a:buNone/>
+            </a:pPr>
+            <a:endParaRPr lang="en-US" dirty="0"/>
+          </a:p>
+          <a:p>
+            <a:pPr marL="0" indent="0">
+              <a:buNone/>
+            </a:pPr>
+            <a:r>
+              <a:rPr lang="en-US" dirty="0"/>
+              <a:t>Code located at </a:t>
+            </a:r>
+            <a:r>
+              <a:rPr lang="en-US" dirty="0">
+                <a:hlinkClick r:id="rId2"/>
+              </a:rPr>
+              <a:t>https://</a:t>
+            </a:r>
+            <a:r>
+              <a:rPr lang="en-US" dirty="0" smtClean="0">
+                <a:hlinkClick r:id="rId2"/>
+              </a:rPr>
+              <a:t>github.com/Calvinxc1/TensorFlow_Presentation/blob/master/TensorFlow%20Demo.ipynb</a:t>
+            </a:r>
+            <a:endParaRPr lang="en-US" dirty="0" smtClean="0"/>
+          </a:p>
+          <a:p>
+            <a:pPr marL="0" indent="0">
+              <a:buNone/>
+            </a:pPr>
+            <a:endParaRPr lang="en-US" dirty="0" smtClean="0"/>
+          </a:p>
+          <a:p>
+            <a:pPr marL="0" indent="0">
+              <a:buNone/>
+            </a:pPr>
+            <a:r>
+              <a:rPr lang="en-US" dirty="0"/>
+              <a:t>Dataset located at </a:t>
+            </a:r>
+            <a:r>
+              <a:rPr lang="en-US" dirty="0">
+                <a:hlinkClick r:id="rId3"/>
+              </a:rPr>
+              <a:t>https://</a:t>
+            </a:r>
+            <a:r>
+              <a:rPr lang="en-US" dirty="0" smtClean="0">
+                <a:hlinkClick r:id="rId3"/>
+              </a:rPr>
+              <a:t>github.com/Calvinxc1/TensorFlow_Presentation/blob/master/test_data/minerals_verge_market.csv</a:t>
+            </a:r>
+            <a:endParaRPr lang="en-US" dirty="0" smtClean="0"/>
+          </a:p>
+          <a:p>
+            <a:pPr marL="0" indent="0">
+              <a:buNone/>
+            </a:pPr>
+            <a:endParaRPr lang="en-US" dirty="0"/>
+          </a:p>
+          <a:p>
+            <a:pPr marL="0" indent="0">
+              <a:buNone/>
+            </a:pPr>
+            <a:r>
+              <a:rPr lang="en-US" dirty="0" smtClean="0"/>
+              <a:t>Make sure dataset is in the </a:t>
+            </a:r>
+            <a:r>
+              <a:rPr lang="en-US" dirty="0" err="1" smtClean="0"/>
+              <a:t>test_data</a:t>
+            </a:r>
+            <a:r>
+              <a:rPr lang="en-US" dirty="0" smtClean="0"/>
+              <a:t> folder under where the .</a:t>
+            </a:r>
+            <a:r>
+              <a:rPr lang="en-US" dirty="0" err="1" smtClean="0"/>
+              <a:t>ipynb</a:t>
+            </a:r>
+            <a:r>
+              <a:rPr lang="en-US" smtClean="0"/>
+              <a:t> file is</a:t>
             </a:r>
             <a:endParaRPr lang="en-US" dirty="0"/>
           </a:p>
@@ -7790,7 +7888,7 @@
             </a:r>
             <a:r>
               <a:rPr lang="en-US" dirty="0" smtClean="0"/>
-              <a:t> Overview</a:t>
+              <a:t> Overview (presentation)</a:t>
             </a:r>
           </a:p>
           <a:p>
@@ -7836,7 +7934,10 @@
               <a:rPr lang="en-US" dirty="0" err="1" smtClean="0"/>
               <a:t>TensorFlow</a:t>
             </a:r>
-            <a:endParaRPr lang="en-US" dirty="0" smtClean="0"/>
+            <a:r>
+              <a:rPr lang="en-US" dirty="0" smtClean="0"/>
+              <a:t> (demo)</a:t>
+            </a:r>
           </a:p>
           <a:p>
             <a:pPr lvl="1"/>
@@ -7860,7 +7961,7 @@
             </a:r>
             <a:r>
               <a:rPr lang="en-US" dirty="0" smtClean="0"/>
-              <a:t> in Machine Learning/Data Science (Live Demo)</a:t>
+              <a:t> in Machine Learning/Data Science (demo)</a:t>
             </a:r>
           </a:p>
           <a:p>
@@ -7986,7 +8087,7 @@
             </a:r>
             <a:r>
               <a:rPr lang="en-US" dirty="0" smtClean="0"/>
-              <a:t> is a library developed by Google.</a:t>
+              <a:t> is a library developed by the Google Brain team at Google.</a:t>
             </a:r>
           </a:p>
           <a:p>
@@ -8159,7 +8260,7 @@
             </a:r>
             <a:r>
               <a:rPr lang="en-US" dirty="0" smtClean="0"/>
-              <a:t> is a Python library developed by the Montreal Institute for Leaning Algorithms. It is no longer in active development however.</a:t>
+              <a:t> is a Python library developed by the Montreal Institute for Leaning Algorithms. It is, however, no longer being actively developed.</a:t>
             </a:r>
           </a:p>
           <a:p>
@@ -8212,7 +8313,7 @@
           <a:p>
             <a:r>
               <a:rPr lang="en-US" dirty="0" smtClean="0"/>
-              <a:t>Better computation graph visualization</a:t>
+              <a:t>Better visualization options</a:t>
             </a:r>
           </a:p>
           <a:p>
@@ -8322,7 +8423,10 @@
               <a:rPr lang="en-US" dirty="0" err="1" smtClean="0"/>
               <a:t>SciPy</a:t>
             </a:r>
-            <a:endParaRPr lang="en-US" dirty="0" smtClean="0"/>
+            <a:r>
+              <a:rPr lang="en-US" dirty="0" smtClean="0"/>
+              <a:t>. It’s developed (mainly) by Facebook’s AI Research Group.</a:t>
+            </a:r>
           </a:p>
           <a:p>
             <a:pPr marL="0" indent="0">
@@ -8518,14 +8622,35 @@
           <a:p>
             <a:r>
               <a:rPr lang="en-US" dirty="0" smtClean="0"/>
-              <a:t>Easier to use</a:t>
-            </a:r>
-          </a:p>
-          <a:p>
-            <a:r>
-              <a:rPr lang="en-US" dirty="0" smtClean="0"/>
-              <a:t>Code can be much more compact</a:t>
-            </a:r>
+              <a:t>Easier to </a:t>
+            </a:r>
+            <a:r>
+              <a:rPr lang="en-US" dirty="0" smtClean="0"/>
+              <a:t>use, code </a:t>
+            </a:r>
+            <a:r>
+              <a:rPr lang="en-US" dirty="0" smtClean="0"/>
+              <a:t>can be much more </a:t>
+            </a:r>
+            <a:r>
+              <a:rPr lang="en-US" dirty="0" smtClean="0"/>
+              <a:t>compact</a:t>
+            </a:r>
+          </a:p>
+          <a:p>
+            <a:r>
+              <a:rPr lang="en-US" dirty="0" smtClean="0"/>
+              <a:t>Still have access to </a:t>
+            </a:r>
+            <a:r>
+              <a:rPr lang="en-US" smtClean="0"/>
+              <a:t>TensorFlow’s </a:t>
+            </a:r>
+            <a:r>
+              <a:rPr lang="en-US" dirty="0" smtClean="0"/>
+              <a:t>visualization tools</a:t>
+            </a:r>
+            <a:endParaRPr lang="en-US" dirty="0" smtClean="0"/>
           </a:p>
           <a:p>
             <a:endParaRPr lang="en-US" dirty="0"/>

</xml_diff>